<commit_message>
Finished implementation of the control button
It is now always necessary to press a red button to start up the server.
Also added a progress bar for visualizing the boot up process.
</commit_message>
<xml_diff>
--- a/Firmware/Raspberry/sequences/Correct.pptx
+++ b/Firmware/Raspberry/sequences/Correct.pptx
@@ -6,6 +6,8 @@
   </p:sldMasterIdLst>
   <p:sldIdLst>
     <p:sldId id="256" r:id="rId2"/>
+    <p:sldId id="258" r:id="rId3"/>
+    <p:sldId id="257" r:id="rId4"/>
   </p:sldIdLst>
   <p:sldSz cx="12192000" cy="6858000"/>
   <p:notesSz cx="6858000" cy="9144000"/>
@@ -104,6 +106,11 @@
       </a:defRPr>
     </a:lvl9pPr>
   </p:defaultTextStyle>
+  <p:extLst>
+    <p:ext uri="{EFAFB233-063F-42B5-8137-9DF3F51BA10A}">
+      <p15:sldGuideLst xmlns:p15="http://schemas.microsoft.com/office/powerpoint/2012/main"/>
+    </p:ext>
+  </p:extLst>
 </p:presentation>
 </file>
 
@@ -254,7 +261,7 @@
           <a:p>
             <a:fld id="{CFCE323F-31E8-4BCC-B732-F0E86A5677E4}" type="datetimeFigureOut">
               <a:rPr lang="de-DE" smtClean="0"/>
-              <a:t>25.01.2022</a:t>
+              <a:t>28.01.2022</a:t>
             </a:fld>
             <a:endParaRPr lang="de-DE"/>
           </a:p>
@@ -452,7 +459,7 @@
           <a:p>
             <a:fld id="{CFCE323F-31E8-4BCC-B732-F0E86A5677E4}" type="datetimeFigureOut">
               <a:rPr lang="de-DE" smtClean="0"/>
-              <a:t>25.01.2022</a:t>
+              <a:t>28.01.2022</a:t>
             </a:fld>
             <a:endParaRPr lang="de-DE"/>
           </a:p>
@@ -660,7 +667,7 @@
           <a:p>
             <a:fld id="{CFCE323F-31E8-4BCC-B732-F0E86A5677E4}" type="datetimeFigureOut">
               <a:rPr lang="de-DE" smtClean="0"/>
-              <a:t>25.01.2022</a:t>
+              <a:t>28.01.2022</a:t>
             </a:fld>
             <a:endParaRPr lang="de-DE"/>
           </a:p>
@@ -858,7 +865,7 @@
           <a:p>
             <a:fld id="{CFCE323F-31E8-4BCC-B732-F0E86A5677E4}" type="datetimeFigureOut">
               <a:rPr lang="de-DE" smtClean="0"/>
-              <a:t>25.01.2022</a:t>
+              <a:t>28.01.2022</a:t>
             </a:fld>
             <a:endParaRPr lang="de-DE"/>
           </a:p>
@@ -1133,7 +1140,7 @@
           <a:p>
             <a:fld id="{CFCE323F-31E8-4BCC-B732-F0E86A5677E4}" type="datetimeFigureOut">
               <a:rPr lang="de-DE" smtClean="0"/>
-              <a:t>25.01.2022</a:t>
+              <a:t>28.01.2022</a:t>
             </a:fld>
             <a:endParaRPr lang="de-DE"/>
           </a:p>
@@ -1398,7 +1405,7 @@
           <a:p>
             <a:fld id="{CFCE323F-31E8-4BCC-B732-F0E86A5677E4}" type="datetimeFigureOut">
               <a:rPr lang="de-DE" smtClean="0"/>
-              <a:t>25.01.2022</a:t>
+              <a:t>28.01.2022</a:t>
             </a:fld>
             <a:endParaRPr lang="de-DE"/>
           </a:p>
@@ -1810,7 +1817,7 @@
           <a:p>
             <a:fld id="{CFCE323F-31E8-4BCC-B732-F0E86A5677E4}" type="datetimeFigureOut">
               <a:rPr lang="de-DE" smtClean="0"/>
-              <a:t>25.01.2022</a:t>
+              <a:t>28.01.2022</a:t>
             </a:fld>
             <a:endParaRPr lang="de-DE"/>
           </a:p>
@@ -1951,7 +1958,7 @@
           <a:p>
             <a:fld id="{CFCE323F-31E8-4BCC-B732-F0E86A5677E4}" type="datetimeFigureOut">
               <a:rPr lang="de-DE" smtClean="0"/>
-              <a:t>25.01.2022</a:t>
+              <a:t>28.01.2022</a:t>
             </a:fld>
             <a:endParaRPr lang="de-DE"/>
           </a:p>
@@ -2064,7 +2071,7 @@
           <a:p>
             <a:fld id="{CFCE323F-31E8-4BCC-B732-F0E86A5677E4}" type="datetimeFigureOut">
               <a:rPr lang="de-DE" smtClean="0"/>
-              <a:t>25.01.2022</a:t>
+              <a:t>28.01.2022</a:t>
             </a:fld>
             <a:endParaRPr lang="de-DE"/>
           </a:p>
@@ -2375,7 +2382,7 @@
           <a:p>
             <a:fld id="{CFCE323F-31E8-4BCC-B732-F0E86A5677E4}" type="datetimeFigureOut">
               <a:rPr lang="de-DE" smtClean="0"/>
-              <a:t>25.01.2022</a:t>
+              <a:t>28.01.2022</a:t>
             </a:fld>
             <a:endParaRPr lang="de-DE"/>
           </a:p>
@@ -2663,7 +2670,7 @@
           <a:p>
             <a:fld id="{CFCE323F-31E8-4BCC-B732-F0E86A5677E4}" type="datetimeFigureOut">
               <a:rPr lang="de-DE" smtClean="0"/>
-              <a:t>25.01.2022</a:t>
+              <a:t>28.01.2022</a:t>
             </a:fld>
             <a:endParaRPr lang="de-DE"/>
           </a:p>
@@ -2904,7 +2911,7 @@
           <a:p>
             <a:fld id="{CFCE323F-31E8-4BCC-B732-F0E86A5677E4}" type="datetimeFigureOut">
               <a:rPr lang="de-DE" smtClean="0"/>
-              <a:t>25.01.2022</a:t>
+              <a:t>28.01.2022</a:t>
             </a:fld>
             <a:endParaRPr lang="de-DE"/>
           </a:p>
@@ -3349,8 +3356,8 @@
         </p:nvSpPr>
         <p:spPr>
           <a:xfrm>
-            <a:off x="1524000" y="1243013"/>
-            <a:ext cx="9144000" cy="4371974"/>
+            <a:off x="783770" y="1321302"/>
+            <a:ext cx="10646229" cy="4215395"/>
           </a:xfrm>
         </p:spPr>
         <p:txBody>
@@ -3361,46 +3368,63 @@
           <a:p>
             <a:r>
               <a:rPr lang="de-DE" sz="10000" dirty="0"/>
-              <a:t>Code </a:t>
+              <a:t>Press and hold </a:t>
             </a:r>
             <a:r>
               <a:rPr lang="de-DE" sz="10000" dirty="0" err="1"/>
-              <a:t>correct</a:t>
+              <a:t>red</a:t>
+            </a:r>
+            <a:r>
+              <a:rPr lang="de-DE" sz="10000" dirty="0"/>
+              <a:t> </a:t>
+            </a:r>
+            <a:r>
+              <a:rPr lang="de-DE" sz="10000" dirty="0" err="1"/>
+              <a:t>button</a:t>
+            </a:r>
+            <a:r>
+              <a:rPr lang="de-DE" sz="10000" dirty="0"/>
+              <a:t> </a:t>
+            </a:r>
+            <a:r>
+              <a:rPr lang="de-DE" sz="10000" dirty="0" err="1"/>
+              <a:t>to</a:t>
+            </a:r>
+            <a:r>
+              <a:rPr lang="de-DE" sz="10000" dirty="0"/>
+              <a:t> </a:t>
+            </a:r>
+            <a:r>
+              <a:rPr lang="de-DE" sz="10000" dirty="0" err="1"/>
+              <a:t>start</a:t>
+            </a:r>
+            <a:r>
+              <a:rPr lang="de-DE" sz="10000" dirty="0"/>
+              <a:t> </a:t>
+            </a:r>
+            <a:r>
+              <a:rPr lang="de-DE" sz="10000" dirty="0" err="1"/>
+              <a:t>server</a:t>
+            </a:r>
+            <a:r>
+              <a:rPr lang="de-DE" sz="10000" dirty="0"/>
+              <a:t> </a:t>
+            </a:r>
+            <a:r>
+              <a:rPr lang="de-DE" sz="10000" dirty="0" err="1"/>
+              <a:t>boot</a:t>
+            </a:r>
+            <a:r>
+              <a:rPr lang="de-DE" sz="10000" dirty="0"/>
+              <a:t> </a:t>
+            </a:r>
+            <a:r>
+              <a:rPr lang="de-DE" sz="10000" dirty="0" err="1"/>
+              <a:t>process</a:t>
             </a:r>
             <a:r>
               <a:rPr lang="de-DE" sz="10000" dirty="0"/>
               <a:t>.</a:t>
-            </a:r>
-            <a:br>
-              <a:rPr lang="de-DE" sz="10000" dirty="0"/>
-            </a:br>
-            <a:r>
-              <a:rPr lang="de-DE" sz="10000" dirty="0"/>
-              <a:t>Server </a:t>
-            </a:r>
-            <a:r>
-              <a:rPr lang="de-DE" sz="10000" dirty="0" err="1"/>
-              <a:t>is</a:t>
-            </a:r>
-            <a:r>
-              <a:rPr lang="de-DE" sz="10000" dirty="0"/>
-              <a:t> </a:t>
-            </a:r>
-            <a:r>
-              <a:rPr lang="de-DE" sz="10000" dirty="0" err="1"/>
-              <a:t>starting</a:t>
-            </a:r>
-            <a:r>
-              <a:rPr lang="de-DE" sz="10000" dirty="0"/>
-              <a:t> </a:t>
-            </a:r>
-            <a:r>
-              <a:rPr lang="de-DE" sz="10000" dirty="0" err="1"/>
-              <a:t>up</a:t>
-            </a:r>
-            <a:r>
-              <a:rPr lang="de-DE" sz="10000" dirty="0"/>
-              <a:t>…</a:t>
             </a:r>
           </a:p>
         </p:txBody>
@@ -3409,6 +3433,271 @@
     <p:extLst>
       <p:ext uri="{BB962C8B-B14F-4D97-AF65-F5344CB8AC3E}">
         <p14:creationId xmlns:p14="http://schemas.microsoft.com/office/powerpoint/2010/main" val="3547072287"/>
+      </p:ext>
+    </p:extLst>
+  </p:cSld>
+  <p:clrMapOvr>
+    <a:masterClrMapping/>
+  </p:clrMapOvr>
+</p:sld>
+</file>
+
+<file path=ppt/slides/slide2.xml><?xml version="1.0" encoding="utf-8"?>
+<p:sld xmlns:a="http://schemas.openxmlformats.org/drawingml/2006/main" xmlns:r="http://schemas.openxmlformats.org/officeDocument/2006/relationships" xmlns:p="http://schemas.openxmlformats.org/presentationml/2006/main">
+  <p:cSld>
+    <p:bg>
+      <p:bgPr>
+        <a:solidFill>
+          <a:schemeClr val="bg1">
+            <a:lumMod val="75000"/>
+          </a:schemeClr>
+        </a:solidFill>
+        <a:effectLst/>
+      </p:bgPr>
+    </p:bg>
+    <p:spTree>
+      <p:nvGrpSpPr>
+        <p:cNvPr id="1" name=""/>
+        <p:cNvGrpSpPr/>
+        <p:nvPr/>
+      </p:nvGrpSpPr>
+      <p:grpSpPr>
+        <a:xfrm>
+          <a:off x="0" y="0"/>
+          <a:ext cx="0" cy="0"/>
+          <a:chOff x="0" y="0"/>
+          <a:chExt cx="0" cy="0"/>
+        </a:xfrm>
+      </p:grpSpPr>
+      <p:sp>
+        <p:nvSpPr>
+          <p:cNvPr id="2" name="Titel 1">
+            <a:extLst>
+              <a:ext uri="{FF2B5EF4-FFF2-40B4-BE49-F238E27FC236}">
+                <a16:creationId xmlns:a16="http://schemas.microsoft.com/office/drawing/2014/main" id="{F2A10E1F-54EE-4BE5-A275-51E08099DF11}"/>
+              </a:ext>
+            </a:extLst>
+          </p:cNvPr>
+          <p:cNvSpPr>
+            <a:spLocks noGrp="1"/>
+          </p:cNvSpPr>
+          <p:nvPr>
+            <p:ph type="ctrTitle"/>
+          </p:nvPr>
+        </p:nvSpPr>
+        <p:spPr>
+          <a:xfrm>
+            <a:off x="447870" y="1321302"/>
+            <a:ext cx="11271380" cy="4215395"/>
+          </a:xfrm>
+        </p:spPr>
+        <p:txBody>
+          <a:bodyPr>
+            <a:noAutofit/>
+          </a:bodyPr>
+          <a:lstStyle/>
+          <a:p>
+            <a:r>
+              <a:rPr lang="de-DE" sz="10000" dirty="0" err="1"/>
+              <a:t>Safety</a:t>
+            </a:r>
+            <a:r>
+              <a:rPr lang="de-DE" sz="10000" dirty="0"/>
+              <a:t> </a:t>
+            </a:r>
+            <a:r>
+              <a:rPr lang="de-DE" sz="10000" dirty="0" err="1"/>
+              <a:t>meassure</a:t>
+            </a:r>
+            <a:r>
+              <a:rPr lang="de-DE" sz="10000" dirty="0"/>
+              <a:t>:</a:t>
+            </a:r>
+            <a:br>
+              <a:rPr lang="de-DE" sz="10000" dirty="0"/>
+            </a:br>
+            <a:r>
+              <a:rPr lang="de-DE" sz="10000" dirty="0"/>
+              <a:t>Keep </a:t>
+            </a:r>
+            <a:r>
+              <a:rPr lang="de-DE" sz="10000" dirty="0" err="1"/>
+              <a:t>pressing</a:t>
+            </a:r>
+            <a:r>
+              <a:rPr lang="de-DE" sz="10000" dirty="0"/>
+              <a:t> </a:t>
+            </a:r>
+            <a:r>
+              <a:rPr lang="de-DE" sz="10000" dirty="0" err="1"/>
+              <a:t>the</a:t>
+            </a:r>
+            <a:r>
+              <a:rPr lang="de-DE" sz="10000" dirty="0"/>
+              <a:t> </a:t>
+            </a:r>
+            <a:r>
+              <a:rPr lang="de-DE" sz="10000" dirty="0" err="1"/>
+              <a:t>button</a:t>
+            </a:r>
+            <a:r>
+              <a:rPr lang="de-DE" sz="10000" dirty="0"/>
+              <a:t> </a:t>
+            </a:r>
+            <a:r>
+              <a:rPr lang="de-DE" sz="10000" dirty="0" err="1"/>
+              <a:t>during</a:t>
+            </a:r>
+            <a:r>
+              <a:rPr lang="de-DE" sz="10000" dirty="0"/>
+              <a:t> </a:t>
+            </a:r>
+            <a:r>
+              <a:rPr lang="de-DE" sz="10000" dirty="0" err="1"/>
+              <a:t>bootup</a:t>
+            </a:r>
+            <a:endParaRPr lang="de-DE" sz="10000" dirty="0"/>
+          </a:p>
+        </p:txBody>
+      </p:sp>
+    </p:spTree>
+    <p:extLst>
+      <p:ext uri="{BB962C8B-B14F-4D97-AF65-F5344CB8AC3E}">
+        <p14:creationId xmlns:p14="http://schemas.microsoft.com/office/powerpoint/2010/main" val="1699250548"/>
+      </p:ext>
+    </p:extLst>
+  </p:cSld>
+  <p:clrMapOvr>
+    <a:masterClrMapping/>
+  </p:clrMapOvr>
+</p:sld>
+</file>
+
+<file path=ppt/slides/slide3.xml><?xml version="1.0" encoding="utf-8"?>
+<p:sld xmlns:a="http://schemas.openxmlformats.org/drawingml/2006/main" xmlns:r="http://schemas.openxmlformats.org/officeDocument/2006/relationships" xmlns:p="http://schemas.openxmlformats.org/presentationml/2006/main">
+  <p:cSld>
+    <p:bg>
+      <p:bgPr>
+        <a:solidFill>
+          <a:schemeClr val="bg1">
+            <a:lumMod val="75000"/>
+          </a:schemeClr>
+        </a:solidFill>
+        <a:effectLst/>
+      </p:bgPr>
+    </p:bg>
+    <p:spTree>
+      <p:nvGrpSpPr>
+        <p:cNvPr id="1" name=""/>
+        <p:cNvGrpSpPr/>
+        <p:nvPr/>
+      </p:nvGrpSpPr>
+      <p:grpSpPr>
+        <a:xfrm>
+          <a:off x="0" y="0"/>
+          <a:ext cx="0" cy="0"/>
+          <a:chOff x="0" y="0"/>
+          <a:chExt cx="0" cy="0"/>
+        </a:xfrm>
+      </p:grpSpPr>
+      <p:sp>
+        <p:nvSpPr>
+          <p:cNvPr id="2" name="Titel 1">
+            <a:extLst>
+              <a:ext uri="{FF2B5EF4-FFF2-40B4-BE49-F238E27FC236}">
+                <a16:creationId xmlns:a16="http://schemas.microsoft.com/office/drawing/2014/main" id="{F2A10E1F-54EE-4BE5-A275-51E08099DF11}"/>
+              </a:ext>
+            </a:extLst>
+          </p:cNvPr>
+          <p:cNvSpPr>
+            <a:spLocks noGrp="1"/>
+          </p:cNvSpPr>
+          <p:nvPr>
+            <p:ph type="ctrTitle"/>
+          </p:nvPr>
+        </p:nvSpPr>
+        <p:spPr>
+          <a:xfrm>
+            <a:off x="679579" y="1321302"/>
+            <a:ext cx="10832841" cy="4215395"/>
+          </a:xfrm>
+        </p:spPr>
+        <p:txBody>
+          <a:bodyPr>
+            <a:noAutofit/>
+          </a:bodyPr>
+          <a:lstStyle/>
+          <a:p>
+            <a:r>
+              <a:rPr lang="de-DE" sz="10000" dirty="0"/>
+              <a:t>Server </a:t>
+            </a:r>
+            <a:r>
+              <a:rPr lang="de-DE" sz="10000" dirty="0" err="1"/>
+              <a:t>is</a:t>
+            </a:r>
+            <a:r>
+              <a:rPr lang="de-DE" sz="10000" dirty="0"/>
+              <a:t> </a:t>
+            </a:r>
+            <a:r>
+              <a:rPr lang="de-DE" sz="10000" dirty="0" err="1"/>
+              <a:t>starting</a:t>
+            </a:r>
+            <a:r>
+              <a:rPr lang="de-DE" sz="10000" dirty="0"/>
+              <a:t> </a:t>
+            </a:r>
+            <a:r>
+              <a:rPr lang="de-DE" sz="10000" dirty="0" err="1"/>
+              <a:t>up</a:t>
+            </a:r>
+            <a:r>
+              <a:rPr lang="de-DE" sz="10000" dirty="0"/>
+              <a:t>.</a:t>
+            </a:r>
+            <a:br>
+              <a:rPr lang="de-DE" sz="10000" dirty="0"/>
+            </a:br>
+            <a:r>
+              <a:rPr lang="de-DE" sz="10000" dirty="0" err="1"/>
+              <a:t>Please</a:t>
+            </a:r>
+            <a:r>
+              <a:rPr lang="de-DE" sz="10000" dirty="0"/>
+              <a:t> </a:t>
+            </a:r>
+            <a:r>
+              <a:rPr lang="de-DE" sz="10000" dirty="0" err="1"/>
+              <a:t>enter</a:t>
+            </a:r>
+            <a:r>
+              <a:rPr lang="de-DE" sz="10000" dirty="0"/>
+              <a:t> Code on </a:t>
+            </a:r>
+            <a:r>
+              <a:rPr lang="de-DE" sz="10000" dirty="0" err="1"/>
+              <a:t>the</a:t>
+            </a:r>
+            <a:r>
+              <a:rPr lang="de-DE" sz="10000" dirty="0"/>
+              <a:t> </a:t>
+            </a:r>
+            <a:r>
+              <a:rPr lang="de-DE" sz="10000" dirty="0" err="1"/>
+              <a:t>next</a:t>
+            </a:r>
+            <a:r>
+              <a:rPr lang="de-DE" sz="10000" dirty="0"/>
+              <a:t> screen.</a:t>
+            </a:r>
+          </a:p>
+        </p:txBody>
+      </p:sp>
+    </p:spTree>
+    <p:extLst>
+      <p:ext uri="{BB962C8B-B14F-4D97-AF65-F5344CB8AC3E}">
+        <p14:creationId xmlns:p14="http://schemas.microsoft.com/office/powerpoint/2010/main" val="2410913411"/>
       </p:ext>
     </p:extLst>
   </p:cSld>

</xml_diff>